<commit_message>
ppt_maker.py 완성: 한 슬라이드 당 article 4개씩 배치
template ppt도 수정함. 이 template ppt를 기준으로 삼으면 될 듯
</commit_message>
<xml_diff>
--- a/backend/template.pptx
+++ b/backend/template.pptx
@@ -232,7 +232,7 @@
           <a:p>
             <a:fld id="{E202920A-988E-4ACC-9711-3E09BBA6F025}" type="datetimeFigureOut">
               <a:rPr lang="ko-KR" altLang="en-US" smtClean="0"/>
-              <a:t>2024-12-08</a:t>
+              <a:t>2024-12-09</a:t>
             </a:fld>
             <a:endParaRPr lang="ko-KR" altLang="en-US"/>
           </a:p>
@@ -661,7 +661,7 @@
           <a:p>
             <a:fld id="{E202920A-988E-4ACC-9711-3E09BBA6F025}" type="datetimeFigureOut">
               <a:rPr lang="ko-KR" altLang="en-US" smtClean="0"/>
-              <a:t>2024-12-08</a:t>
+              <a:t>2024-12-09</a:t>
             </a:fld>
             <a:endParaRPr lang="ko-KR" altLang="en-US"/>
           </a:p>
@@ -841,7 +841,7 @@
           <a:p>
             <a:fld id="{E202920A-988E-4ACC-9711-3E09BBA6F025}" type="datetimeFigureOut">
               <a:rPr lang="ko-KR" altLang="en-US" smtClean="0"/>
-              <a:t>2024-12-08</a:t>
+              <a:t>2024-12-09</a:t>
             </a:fld>
             <a:endParaRPr lang="ko-KR" altLang="en-US"/>
           </a:p>
@@ -1054,7 +1054,7 @@
           <a:p>
             <a:fld id="{E202920A-988E-4ACC-9711-3E09BBA6F025}" type="datetimeFigureOut">
               <a:rPr lang="ko-KR" altLang="en-US" smtClean="0"/>
-              <a:t>2024-12-08</a:t>
+              <a:t>2024-12-09</a:t>
             </a:fld>
             <a:endParaRPr lang="ko-KR" altLang="en-US"/>
           </a:p>
@@ -1469,7 +1469,7 @@
           <a:p>
             <a:fld id="{E202920A-988E-4ACC-9711-3E09BBA6F025}" type="datetimeFigureOut">
               <a:rPr lang="ko-KR" altLang="en-US" smtClean="0"/>
-              <a:t>2024-12-08</a:t>
+              <a:t>2024-12-09</a:t>
             </a:fld>
             <a:endParaRPr lang="ko-KR" altLang="en-US"/>
           </a:p>
@@ -1701,7 +1701,7 @@
           <a:p>
             <a:fld id="{E202920A-988E-4ACC-9711-3E09BBA6F025}" type="datetimeFigureOut">
               <a:rPr lang="ko-KR" altLang="en-US" smtClean="0"/>
-              <a:t>2024-12-08</a:t>
+              <a:t>2024-12-09</a:t>
             </a:fld>
             <a:endParaRPr lang="ko-KR" altLang="en-US"/>
           </a:p>
@@ -2068,7 +2068,7 @@
           <a:p>
             <a:fld id="{E202920A-988E-4ACC-9711-3E09BBA6F025}" type="datetimeFigureOut">
               <a:rPr lang="ko-KR" altLang="en-US" smtClean="0"/>
-              <a:t>2024-12-08</a:t>
+              <a:t>2024-12-09</a:t>
             </a:fld>
             <a:endParaRPr lang="ko-KR" altLang="en-US"/>
           </a:p>
@@ -2186,7 +2186,7 @@
           <a:p>
             <a:fld id="{E202920A-988E-4ACC-9711-3E09BBA6F025}" type="datetimeFigureOut">
               <a:rPr lang="ko-KR" altLang="en-US" smtClean="0"/>
-              <a:t>2024-12-08</a:t>
+              <a:t>2024-12-09</a:t>
             </a:fld>
             <a:endParaRPr lang="ko-KR" altLang="en-US"/>
           </a:p>
@@ -2281,7 +2281,7 @@
           <a:p>
             <a:fld id="{E202920A-988E-4ACC-9711-3E09BBA6F025}" type="datetimeFigureOut">
               <a:rPr lang="ko-KR" altLang="en-US" smtClean="0"/>
-              <a:t>2024-12-08</a:t>
+              <a:t>2024-12-09</a:t>
             </a:fld>
             <a:endParaRPr lang="ko-KR" altLang="en-US"/>
           </a:p>
@@ -2558,7 +2558,7 @@
           <a:p>
             <a:fld id="{E202920A-988E-4ACC-9711-3E09BBA6F025}" type="datetimeFigureOut">
               <a:rPr lang="ko-KR" altLang="en-US" smtClean="0"/>
-              <a:t>2024-12-08</a:t>
+              <a:t>2024-12-09</a:t>
             </a:fld>
             <a:endParaRPr lang="ko-KR" altLang="en-US"/>
           </a:p>
@@ -2815,7 +2815,7 @@
           <a:p>
             <a:fld id="{E202920A-988E-4ACC-9711-3E09BBA6F025}" type="datetimeFigureOut">
               <a:rPr lang="ko-KR" altLang="en-US" smtClean="0"/>
-              <a:t>2024-12-08</a:t>
+              <a:t>2024-12-09</a:t>
             </a:fld>
             <a:endParaRPr lang="ko-KR" altLang="en-US"/>
           </a:p>
@@ -3028,7 +3028,7 @@
           <a:p>
             <a:fld id="{E202920A-988E-4ACC-9711-3E09BBA6F025}" type="datetimeFigureOut">
               <a:rPr lang="ko-KR" altLang="en-US" smtClean="0"/>
-              <a:t>2024-12-08</a:t>
+              <a:t>2024-12-09</a:t>
             </a:fld>
             <a:endParaRPr lang="ko-KR" altLang="en-US"/>
           </a:p>
@@ -3628,49 +3628,210 @@
       </p:sp>
       <p:sp>
         <p:nvSpPr>
-          <p:cNvPr id="2" name="TextBox 1">
+          <p:cNvPr id="7" name="부제목 4">
             <a:extLst>
               <a:ext uri="{FF2B5EF4-FFF2-40B4-BE49-F238E27FC236}">
-                <a16:creationId xmlns:a16="http://schemas.microsoft.com/office/drawing/2014/main" id="{B357921E-1B0A-3FD8-9712-6F93778243B3}"/>
+                <a16:creationId xmlns:a16="http://schemas.microsoft.com/office/drawing/2014/main" id="{AB489A44-E81D-0CA8-70CB-2A599BD42266}"/>
               </a:ext>
             </a:extLst>
           </p:cNvPr>
-          <p:cNvSpPr txBox="1"/>
+          <p:cNvSpPr txBox="1">
+            <a:spLocks/>
+          </p:cNvSpPr>
           <p:nvPr/>
         </p:nvSpPr>
         <p:spPr>
           <a:xfrm>
-            <a:off x="9144000" y="17647043"/>
-            <a:ext cx="13716000" cy="923330"/>
+            <a:off x="3429000" y="17154280"/>
+            <a:ext cx="20574000" cy="2160000"/>
           </a:xfrm>
           <a:prstGeom prst="rect">
             <a:avLst/>
           </a:prstGeom>
-          <a:noFill/>
         </p:spPr>
         <p:txBody>
-          <a:bodyPr wrap="square">
-            <a:spAutoFit/>
+          <a:bodyPr vert="horz" lIns="91440" tIns="45720" rIns="91440" bIns="45720" rtlCol="0" anchor="ctr" anchorCtr="0">
+            <a:normAutofit/>
           </a:bodyPr>
-          <a:lstStyle/>
-          <a:p>
-            <a:pPr marL="0" indent="0">
+          <a:lstStyle>
+            <a:lvl1pPr marL="0" indent="0" algn="ctr" defTabSz="2743200" rtl="0" eaLnBrk="1" latinLnBrk="1" hangingPunct="1">
               <a:lnSpc>
-                <a:spcPct val="100000"/>
+                <a:spcPct val="90000"/>
               </a:lnSpc>
               <a:spcBef>
-                <a:spcPts val="2000"/>
+                <a:spcPts val="3000"/>
               </a:spcBef>
-              <a:buNone/>
-            </a:pPr>
-            <a:r>
-              <a:rPr lang="ko-KR" altLang="en-US" sz="5400" dirty="0">
+              <a:buFont typeface="Arial" panose="020B0604020202020204" pitchFamily="34" charset="0"/>
+              <a:buNone/>
+              <a:defRPr sz="8000" kern="1200">
+                <a:solidFill>
+                  <a:schemeClr val="bg1"/>
+                </a:solidFill>
+                <a:latin typeface="나눔스퀘어 Bold" panose="020B0600000101010101" pitchFamily="50" charset="-127"/>
+                <a:ea typeface="나눔스퀘어 Bold" panose="020B0600000101010101" pitchFamily="50" charset="-127"/>
+                <a:cs typeface="+mn-cs"/>
+              </a:defRPr>
+            </a:lvl1pPr>
+            <a:lvl2pPr marL="1371600" indent="0" algn="ctr" defTabSz="2743200" rtl="0" eaLnBrk="1" latinLnBrk="1" hangingPunct="1">
+              <a:lnSpc>
+                <a:spcPct val="90000"/>
+              </a:lnSpc>
+              <a:spcBef>
+                <a:spcPts val="1500"/>
+              </a:spcBef>
+              <a:buFont typeface="Arial" panose="020B0604020202020204" pitchFamily="34" charset="0"/>
+              <a:buNone/>
+              <a:defRPr sz="6000" kern="1200">
+                <a:solidFill>
+                  <a:schemeClr val="tx1"/>
+                </a:solidFill>
+                <a:latin typeface="+mn-lt"/>
+                <a:ea typeface="+mn-ea"/>
+                <a:cs typeface="+mn-cs"/>
+              </a:defRPr>
+            </a:lvl2pPr>
+            <a:lvl3pPr marL="2743200" indent="0" algn="ctr" defTabSz="2743200" rtl="0" eaLnBrk="1" latinLnBrk="1" hangingPunct="1">
+              <a:lnSpc>
+                <a:spcPct val="90000"/>
+              </a:lnSpc>
+              <a:spcBef>
+                <a:spcPts val="1500"/>
+              </a:spcBef>
+              <a:buFont typeface="Arial" panose="020B0604020202020204" pitchFamily="34" charset="0"/>
+              <a:buNone/>
+              <a:defRPr sz="5400" kern="1200">
+                <a:solidFill>
+                  <a:schemeClr val="tx1"/>
+                </a:solidFill>
+                <a:latin typeface="+mn-lt"/>
+                <a:ea typeface="+mn-ea"/>
+                <a:cs typeface="+mn-cs"/>
+              </a:defRPr>
+            </a:lvl3pPr>
+            <a:lvl4pPr marL="4114800" indent="0" algn="ctr" defTabSz="2743200" rtl="0" eaLnBrk="1" latinLnBrk="1" hangingPunct="1">
+              <a:lnSpc>
+                <a:spcPct val="90000"/>
+              </a:lnSpc>
+              <a:spcBef>
+                <a:spcPts val="1500"/>
+              </a:spcBef>
+              <a:buFont typeface="Arial" panose="020B0604020202020204" pitchFamily="34" charset="0"/>
+              <a:buNone/>
+              <a:defRPr sz="4800" kern="1200">
+                <a:solidFill>
+                  <a:schemeClr val="tx1"/>
+                </a:solidFill>
+                <a:latin typeface="+mn-lt"/>
+                <a:ea typeface="+mn-ea"/>
+                <a:cs typeface="+mn-cs"/>
+              </a:defRPr>
+            </a:lvl4pPr>
+            <a:lvl5pPr marL="5486400" indent="0" algn="ctr" defTabSz="2743200" rtl="0" eaLnBrk="1" latinLnBrk="1" hangingPunct="1">
+              <a:lnSpc>
+                <a:spcPct val="90000"/>
+              </a:lnSpc>
+              <a:spcBef>
+                <a:spcPts val="1500"/>
+              </a:spcBef>
+              <a:buFont typeface="Arial" panose="020B0604020202020204" pitchFamily="34" charset="0"/>
+              <a:buNone/>
+              <a:defRPr sz="4800" kern="1200">
+                <a:solidFill>
+                  <a:schemeClr val="tx1"/>
+                </a:solidFill>
+                <a:latin typeface="+mn-lt"/>
+                <a:ea typeface="+mn-ea"/>
+                <a:cs typeface="+mn-cs"/>
+              </a:defRPr>
+            </a:lvl5pPr>
+            <a:lvl6pPr marL="6858000" indent="0" algn="ctr" defTabSz="2743200" rtl="0" eaLnBrk="1" latinLnBrk="1" hangingPunct="1">
+              <a:lnSpc>
+                <a:spcPct val="90000"/>
+              </a:lnSpc>
+              <a:spcBef>
+                <a:spcPts val="1500"/>
+              </a:spcBef>
+              <a:buFont typeface="Arial" panose="020B0604020202020204" pitchFamily="34" charset="0"/>
+              <a:buNone/>
+              <a:defRPr sz="4800" kern="1200">
+                <a:solidFill>
+                  <a:schemeClr val="tx1"/>
+                </a:solidFill>
+                <a:latin typeface="+mn-lt"/>
+                <a:ea typeface="+mn-ea"/>
+                <a:cs typeface="+mn-cs"/>
+              </a:defRPr>
+            </a:lvl6pPr>
+            <a:lvl7pPr marL="8229600" indent="0" algn="ctr" defTabSz="2743200" rtl="0" eaLnBrk="1" latinLnBrk="1" hangingPunct="1">
+              <a:lnSpc>
+                <a:spcPct val="90000"/>
+              </a:lnSpc>
+              <a:spcBef>
+                <a:spcPts val="1500"/>
+              </a:spcBef>
+              <a:buFont typeface="Arial" panose="020B0604020202020204" pitchFamily="34" charset="0"/>
+              <a:buNone/>
+              <a:defRPr sz="4800" kern="1200">
+                <a:solidFill>
+                  <a:schemeClr val="tx1"/>
+                </a:solidFill>
+                <a:latin typeface="+mn-lt"/>
+                <a:ea typeface="+mn-ea"/>
+                <a:cs typeface="+mn-cs"/>
+              </a:defRPr>
+            </a:lvl7pPr>
+            <a:lvl8pPr marL="9601200" indent="0" algn="ctr" defTabSz="2743200" rtl="0" eaLnBrk="1" latinLnBrk="1" hangingPunct="1">
+              <a:lnSpc>
+                <a:spcPct val="90000"/>
+              </a:lnSpc>
+              <a:spcBef>
+                <a:spcPts val="1500"/>
+              </a:spcBef>
+              <a:buFont typeface="Arial" panose="020B0604020202020204" pitchFamily="34" charset="0"/>
+              <a:buNone/>
+              <a:defRPr sz="4800" kern="1200">
+                <a:solidFill>
+                  <a:schemeClr val="tx1"/>
+                </a:solidFill>
+                <a:latin typeface="+mn-lt"/>
+                <a:ea typeface="+mn-ea"/>
+                <a:cs typeface="+mn-cs"/>
+              </a:defRPr>
+            </a:lvl8pPr>
+            <a:lvl9pPr marL="10972800" indent="0" algn="ctr" defTabSz="2743200" rtl="0" eaLnBrk="1" latinLnBrk="1" hangingPunct="1">
+              <a:lnSpc>
+                <a:spcPct val="90000"/>
+              </a:lnSpc>
+              <a:spcBef>
+                <a:spcPts val="1500"/>
+              </a:spcBef>
+              <a:buFont typeface="Arial" panose="020B0604020202020204" pitchFamily="34" charset="0"/>
+              <a:buNone/>
+              <a:defRPr sz="4800" kern="1200">
+                <a:solidFill>
+                  <a:schemeClr val="tx1"/>
+                </a:solidFill>
+                <a:latin typeface="+mn-lt"/>
+                <a:ea typeface="+mn-ea"/>
+                <a:cs typeface="+mn-cs"/>
+              </a:defRPr>
+            </a:lvl9pPr>
+          </a:lstStyle>
+          <a:p>
+            <a:r>
+              <a:rPr lang="ko-KR" altLang="en-US" sz="5400">
+                <a:solidFill>
+                  <a:schemeClr val="tx1"/>
+                </a:solidFill>
                 <a:latin typeface="나눔스퀘어" panose="020B0600000101010101" pitchFamily="50" charset="-127"/>
                 <a:ea typeface="나눔스퀘어" panose="020B0600000101010101" pitchFamily="50" charset="-127"/>
               </a:rPr>
-              <a:t> 담당자</a:t>
-            </a:r>
-            <a:endParaRPr lang="en-US" altLang="ko-KR" sz="5400" dirty="0">
+              <a:t>담당자</a:t>
+            </a:r>
+            <a:endParaRPr lang="ko-KR" altLang="en-US" sz="5400" dirty="0">
+              <a:solidFill>
+                <a:schemeClr val="tx1"/>
+              </a:solidFill>
               <a:latin typeface="나눔스퀘어" panose="020B0600000101010101" pitchFamily="50" charset="-127"/>
               <a:ea typeface="나눔스퀘어" panose="020B0600000101010101" pitchFamily="50" charset="-127"/>
             </a:endParaRPr>
@@ -3739,60 +3900,6 @@
       </p:sp>
       <p:sp>
         <p:nvSpPr>
-          <p:cNvPr id="5" name="직사각형 4">
-            <a:extLst>
-              <a:ext uri="{FF2B5EF4-FFF2-40B4-BE49-F238E27FC236}">
-                <a16:creationId xmlns:a16="http://schemas.microsoft.com/office/drawing/2014/main" id="{28E5F1BE-E90D-6B49-F031-B146B1B14237}"/>
-              </a:ext>
-            </a:extLst>
-          </p:cNvPr>
-          <p:cNvSpPr/>
-          <p:nvPr/>
-        </p:nvSpPr>
-        <p:spPr>
-          <a:xfrm>
-            <a:off x="1873214" y="6388459"/>
-            <a:ext cx="16622610" cy="736693"/>
-          </a:xfrm>
-          <a:prstGeom prst="rect">
-            <a:avLst/>
-          </a:prstGeom>
-          <a:solidFill>
-            <a:srgbClr val="FFDA09">
-              <a:alpha val="49804"/>
-            </a:srgbClr>
-          </a:solidFill>
-          <a:ln>
-            <a:noFill/>
-          </a:ln>
-        </p:spPr>
-        <p:style>
-          <a:lnRef idx="2">
-            <a:schemeClr val="accent1">
-              <a:shade val="15000"/>
-            </a:schemeClr>
-          </a:lnRef>
-          <a:fillRef idx="1">
-            <a:schemeClr val="accent1"/>
-          </a:fillRef>
-          <a:effectRef idx="0">
-            <a:schemeClr val="accent1"/>
-          </a:effectRef>
-          <a:fontRef idx="minor">
-            <a:schemeClr val="lt1"/>
-          </a:fontRef>
-        </p:style>
-        <p:txBody>
-          <a:bodyPr rtlCol="0" anchor="ctr"/>
-          <a:lstStyle/>
-          <a:p>
-            <a:pPr algn="ctr"/>
-            <a:endParaRPr lang="ko-KR" altLang="en-US"/>
-          </a:p>
-        </p:txBody>
-      </p:sp>
-      <p:sp>
-        <p:nvSpPr>
           <p:cNvPr id="12" name="TextBox 11">
             <a:extLst>
               <a:ext uri="{FF2B5EF4-FFF2-40B4-BE49-F238E27FC236}">
@@ -3805,8 +3912,8 @@
         </p:nvSpPr>
         <p:spPr>
           <a:xfrm>
-            <a:off x="1873212" y="5902036"/>
-            <a:ext cx="24561261" cy="1384995"/>
+            <a:off x="1332884" y="5902036"/>
+            <a:ext cx="25641916" cy="1384995"/>
           </a:xfrm>
           <a:prstGeom prst="rect">
             <a:avLst/>
@@ -3843,8 +3950,8 @@
         </p:nvSpPr>
         <p:spPr>
           <a:xfrm>
-            <a:off x="1873212" y="7461372"/>
-            <a:ext cx="16248539" cy="1384995"/>
+            <a:off x="1332885" y="7461372"/>
+            <a:ext cx="15957588" cy="1384995"/>
           </a:xfrm>
           <a:prstGeom prst="rect">
             <a:avLst/>
@@ -3873,64 +3980,10 @@
       </p:sp>
       <p:sp>
         <p:nvSpPr>
-          <p:cNvPr id="14" name="직사각형 13">
+          <p:cNvPr id="3" name="TextBox 2">
             <a:extLst>
               <a:ext uri="{FF2B5EF4-FFF2-40B4-BE49-F238E27FC236}">
-                <a16:creationId xmlns:a16="http://schemas.microsoft.com/office/drawing/2014/main" id="{172D769C-6E75-D9AF-C19E-5411F2868AA2}"/>
-              </a:ext>
-            </a:extLst>
-          </p:cNvPr>
-          <p:cNvSpPr/>
-          <p:nvPr/>
-        </p:nvSpPr>
-        <p:spPr>
-          <a:xfrm>
-            <a:off x="1885952" y="10467595"/>
-            <a:ext cx="16622610" cy="736693"/>
-          </a:xfrm>
-          <a:prstGeom prst="rect">
-            <a:avLst/>
-          </a:prstGeom>
-          <a:solidFill>
-            <a:srgbClr val="FFDA09">
-              <a:alpha val="49804"/>
-            </a:srgbClr>
-          </a:solidFill>
-          <a:ln>
-            <a:noFill/>
-          </a:ln>
-        </p:spPr>
-        <p:style>
-          <a:lnRef idx="2">
-            <a:schemeClr val="accent1">
-              <a:shade val="15000"/>
-            </a:schemeClr>
-          </a:lnRef>
-          <a:fillRef idx="1">
-            <a:schemeClr val="accent1"/>
-          </a:fillRef>
-          <a:effectRef idx="0">
-            <a:schemeClr val="accent1"/>
-          </a:effectRef>
-          <a:fontRef idx="minor">
-            <a:schemeClr val="lt1"/>
-          </a:fontRef>
-        </p:style>
-        <p:txBody>
-          <a:bodyPr rtlCol="0" anchor="ctr"/>
-          <a:lstStyle/>
-          <a:p>
-            <a:pPr algn="ctr"/>
-            <a:endParaRPr lang="ko-KR" altLang="en-US"/>
-          </a:p>
-        </p:txBody>
-      </p:sp>
-      <p:sp>
-        <p:nvSpPr>
-          <p:cNvPr id="15" name="TextBox 14">
-            <a:extLst>
-              <a:ext uri="{FF2B5EF4-FFF2-40B4-BE49-F238E27FC236}">
-                <a16:creationId xmlns:a16="http://schemas.microsoft.com/office/drawing/2014/main" id="{83D0916E-F237-8D67-372E-83C22AC25B3A}"/>
+                <a16:creationId xmlns:a16="http://schemas.microsoft.com/office/drawing/2014/main" id="{C5778584-F8EF-6005-DB71-676865979B50}"/>
               </a:ext>
             </a:extLst>
           </p:cNvPr>
@@ -3939,8 +3992,8 @@
         </p:nvSpPr>
         <p:spPr>
           <a:xfrm>
-            <a:off x="1885950" y="9981172"/>
-            <a:ext cx="23660098" cy="1384995"/>
+            <a:off x="1345621" y="11204288"/>
+            <a:ext cx="25641916" cy="1384995"/>
           </a:xfrm>
           <a:prstGeom prst="rect">
             <a:avLst/>
@@ -3965,10 +4018,10 @@
       </p:sp>
       <p:sp>
         <p:nvSpPr>
-          <p:cNvPr id="16" name="TextBox 15">
+          <p:cNvPr id="4" name="TextBox 3">
             <a:extLst>
               <a:ext uri="{FF2B5EF4-FFF2-40B4-BE49-F238E27FC236}">
-                <a16:creationId xmlns:a16="http://schemas.microsoft.com/office/drawing/2014/main" id="{5A689399-255F-9062-C67C-167F03DE7490}"/>
+                <a16:creationId xmlns:a16="http://schemas.microsoft.com/office/drawing/2014/main" id="{74038220-170D-4D32-5B90-45D12D5A0E0B}"/>
               </a:ext>
             </a:extLst>
           </p:cNvPr>
@@ -3977,8 +4030,8 @@
         </p:nvSpPr>
         <p:spPr>
           <a:xfrm>
-            <a:off x="1885950" y="11540508"/>
-            <a:ext cx="16248539" cy="1384995"/>
+            <a:off x="1345622" y="12763624"/>
+            <a:ext cx="15957588" cy="1384995"/>
           </a:xfrm>
           <a:prstGeom prst="rect">
             <a:avLst/>
@@ -4007,64 +4060,10 @@
       </p:sp>
       <p:sp>
         <p:nvSpPr>
-          <p:cNvPr id="17" name="직사각형 16">
+          <p:cNvPr id="5" name="TextBox 4">
             <a:extLst>
               <a:ext uri="{FF2B5EF4-FFF2-40B4-BE49-F238E27FC236}">
-                <a16:creationId xmlns:a16="http://schemas.microsoft.com/office/drawing/2014/main" id="{00CFB47F-9821-C9F2-5071-C85E1BD90F62}"/>
-              </a:ext>
-            </a:extLst>
-          </p:cNvPr>
-          <p:cNvSpPr/>
-          <p:nvPr/>
-        </p:nvSpPr>
-        <p:spPr>
-          <a:xfrm>
-            <a:off x="1885952" y="14340656"/>
-            <a:ext cx="16622610" cy="736693"/>
-          </a:xfrm>
-          <a:prstGeom prst="rect">
-            <a:avLst/>
-          </a:prstGeom>
-          <a:solidFill>
-            <a:srgbClr val="FFDA09">
-              <a:alpha val="49804"/>
-            </a:srgbClr>
-          </a:solidFill>
-          <a:ln>
-            <a:noFill/>
-          </a:ln>
-        </p:spPr>
-        <p:style>
-          <a:lnRef idx="2">
-            <a:schemeClr val="accent1">
-              <a:shade val="15000"/>
-            </a:schemeClr>
-          </a:lnRef>
-          <a:fillRef idx="1">
-            <a:schemeClr val="accent1"/>
-          </a:fillRef>
-          <a:effectRef idx="0">
-            <a:schemeClr val="accent1"/>
-          </a:effectRef>
-          <a:fontRef idx="minor">
-            <a:schemeClr val="lt1"/>
-          </a:fontRef>
-        </p:style>
-        <p:txBody>
-          <a:bodyPr rtlCol="0" anchor="ctr"/>
-          <a:lstStyle/>
-          <a:p>
-            <a:pPr algn="ctr"/>
-            <a:endParaRPr lang="ko-KR" altLang="en-US"/>
-          </a:p>
-        </p:txBody>
-      </p:sp>
-      <p:sp>
-        <p:nvSpPr>
-          <p:cNvPr id="18" name="TextBox 17">
-            <a:extLst>
-              <a:ext uri="{FF2B5EF4-FFF2-40B4-BE49-F238E27FC236}">
-                <a16:creationId xmlns:a16="http://schemas.microsoft.com/office/drawing/2014/main" id="{F937140E-38A5-6BBB-193C-0DE93A9953B3}"/>
+                <a16:creationId xmlns:a16="http://schemas.microsoft.com/office/drawing/2014/main" id="{63863FEE-A854-350D-BA88-89EF7812BC1C}"/>
               </a:ext>
             </a:extLst>
           </p:cNvPr>
@@ -4073,8 +4072,8 @@
         </p:nvSpPr>
         <p:spPr>
           <a:xfrm>
-            <a:off x="1885950" y="13854233"/>
-            <a:ext cx="24548523" cy="1384995"/>
+            <a:off x="1345621" y="16506540"/>
+            <a:ext cx="25629179" cy="1384995"/>
           </a:xfrm>
           <a:prstGeom prst="rect">
             <a:avLst/>
@@ -4099,10 +4098,10 @@
       </p:sp>
       <p:sp>
         <p:nvSpPr>
-          <p:cNvPr id="19" name="TextBox 18">
+          <p:cNvPr id="6" name="TextBox 5">
             <a:extLst>
               <a:ext uri="{FF2B5EF4-FFF2-40B4-BE49-F238E27FC236}">
-                <a16:creationId xmlns:a16="http://schemas.microsoft.com/office/drawing/2014/main" id="{CD905A85-761E-B1AB-5C24-5E93138E5FAE}"/>
+                <a16:creationId xmlns:a16="http://schemas.microsoft.com/office/drawing/2014/main" id="{378785B5-3BBE-32AE-7D9A-C4CFA254F3B0}"/>
               </a:ext>
             </a:extLst>
           </p:cNvPr>
@@ -4111,8 +4110,8 @@
         </p:nvSpPr>
         <p:spPr>
           <a:xfrm>
-            <a:off x="1885950" y="15413569"/>
-            <a:ext cx="16248539" cy="1384995"/>
+            <a:off x="1345622" y="18065876"/>
+            <a:ext cx="15957588" cy="1384995"/>
           </a:xfrm>
           <a:prstGeom prst="rect">
             <a:avLst/>
@@ -4141,64 +4140,10 @@
       </p:sp>
       <p:sp>
         <p:nvSpPr>
-          <p:cNvPr id="20" name="직사각형 19">
+          <p:cNvPr id="7" name="TextBox 6">
             <a:extLst>
               <a:ext uri="{FF2B5EF4-FFF2-40B4-BE49-F238E27FC236}">
-                <a16:creationId xmlns:a16="http://schemas.microsoft.com/office/drawing/2014/main" id="{940729B1-3CA1-6B9E-28C9-64BEA93E56C0}"/>
-              </a:ext>
-            </a:extLst>
-          </p:cNvPr>
-          <p:cNvSpPr/>
-          <p:nvPr/>
-        </p:nvSpPr>
-        <p:spPr>
-          <a:xfrm>
-            <a:off x="1885952" y="18576526"/>
-            <a:ext cx="16622610" cy="736693"/>
-          </a:xfrm>
-          <a:prstGeom prst="rect">
-            <a:avLst/>
-          </a:prstGeom>
-          <a:solidFill>
-            <a:srgbClr val="FFDA09">
-              <a:alpha val="49804"/>
-            </a:srgbClr>
-          </a:solidFill>
-          <a:ln>
-            <a:noFill/>
-          </a:ln>
-        </p:spPr>
-        <p:style>
-          <a:lnRef idx="2">
-            <a:schemeClr val="accent1">
-              <a:shade val="15000"/>
-            </a:schemeClr>
-          </a:lnRef>
-          <a:fillRef idx="1">
-            <a:schemeClr val="accent1"/>
-          </a:fillRef>
-          <a:effectRef idx="0">
-            <a:schemeClr val="accent1"/>
-          </a:effectRef>
-          <a:fontRef idx="minor">
-            <a:schemeClr val="lt1"/>
-          </a:fontRef>
-        </p:style>
-        <p:txBody>
-          <a:bodyPr rtlCol="0" anchor="ctr"/>
-          <a:lstStyle/>
-          <a:p>
-            <a:pPr algn="ctr"/>
-            <a:endParaRPr lang="ko-KR" altLang="en-US"/>
-          </a:p>
-        </p:txBody>
-      </p:sp>
-      <p:sp>
-        <p:nvSpPr>
-          <p:cNvPr id="21" name="TextBox 20">
-            <a:extLst>
-              <a:ext uri="{FF2B5EF4-FFF2-40B4-BE49-F238E27FC236}">
-                <a16:creationId xmlns:a16="http://schemas.microsoft.com/office/drawing/2014/main" id="{7A50E349-C5CD-E586-B9B1-34C78B1E502B}"/>
+                <a16:creationId xmlns:a16="http://schemas.microsoft.com/office/drawing/2014/main" id="{75090B9B-8C3C-ADDE-FA64-84FB0C8CE84D}"/>
               </a:ext>
             </a:extLst>
           </p:cNvPr>
@@ -4207,8 +4152,8 @@
         </p:nvSpPr>
         <p:spPr>
           <a:xfrm>
-            <a:off x="1885950" y="18090103"/>
-            <a:ext cx="24839468" cy="1384995"/>
+            <a:off x="1345622" y="21808792"/>
+            <a:ext cx="25629178" cy="1384995"/>
           </a:xfrm>
           <a:prstGeom prst="rect">
             <a:avLst/>
@@ -4233,10 +4178,10 @@
       </p:sp>
       <p:sp>
         <p:nvSpPr>
-          <p:cNvPr id="22" name="TextBox 21">
+          <p:cNvPr id="8" name="TextBox 7">
             <a:extLst>
               <a:ext uri="{FF2B5EF4-FFF2-40B4-BE49-F238E27FC236}">
-                <a16:creationId xmlns:a16="http://schemas.microsoft.com/office/drawing/2014/main" id="{D383FEC1-B7C3-CC00-8B57-63886832A03E}"/>
+                <a16:creationId xmlns:a16="http://schemas.microsoft.com/office/drawing/2014/main" id="{75B28A32-215B-F5F9-F604-96B0E6A07C1C}"/>
               </a:ext>
             </a:extLst>
           </p:cNvPr>
@@ -4245,8 +4190,8 @@
         </p:nvSpPr>
         <p:spPr>
           <a:xfrm>
-            <a:off x="1885950" y="19649439"/>
-            <a:ext cx="16248539" cy="1384995"/>
+            <a:off x="1345622" y="23368128"/>
+            <a:ext cx="15957588" cy="1384995"/>
           </a:xfrm>
           <a:prstGeom prst="rect">
             <a:avLst/>

</xml_diff>